<commit_message>
Deploying to gh-pages from @ tpaknok/CPR@a80e48eea18f806b38db9ba2a1842a0c40c2c8f6 🚀
</commit_message>
<xml_diff>
--- a/reference/figures/Logo ppt.pptx
+++ b/reference/figures/Logo ppt.pptx
@@ -115,6 +115,7 @@
 <file path=ppt/revisionInfo.xml><?xml version="1.0" encoding="utf-8"?>
 <p1510:revInfo xmlns:a="http://schemas.openxmlformats.org/drawingml/2006/main" xmlns:r="http://schemas.openxmlformats.org/officeDocument/2006/relationships" xmlns:p1510="http://schemas.microsoft.com/office/powerpoint/2015/10/main">
   <p1510:revLst>
+    <p1510:client id="{2E378DE0-294A-4DB9-B46A-EDADE25D1BC8}" v="2" dt="2024-04-03T00:12:57.822"/>
     <p1510:client id="{51E3AB81-A9B1-430B-9336-349758D1CEE3}" v="27" dt="2024-04-02T23:56:54.276"/>
   </p1510:revLst>
 </p1510:revInfo>
@@ -122,6 +123,62 @@
 
 <file path=ppt/changesInfos/changesInfo1.xml><?xml version="1.0" encoding="utf-8"?>
 <pc:chgInfo xmlns:a="http://schemas.openxmlformats.org/drawingml/2006/main" xmlns:r="http://schemas.openxmlformats.org/officeDocument/2006/relationships" xmlns:ac="http://schemas.microsoft.com/office/drawing/2013/main/command" xmlns:pc="http://schemas.microsoft.com/office/powerpoint/2013/main/command">
+  <pc:docChgLst>
+    <pc:chgData name="Pak Tsang" userId="e597de51-a393-472f-96bf-05139d3f58b1" providerId="ADAL" clId="{2E378DE0-294A-4DB9-B46A-EDADE25D1BC8}"/>
+    <pc:docChg chg="custSel modSld">
+      <pc:chgData name="Pak Tsang" userId="e597de51-a393-472f-96bf-05139d3f58b1" providerId="ADAL" clId="{2E378DE0-294A-4DB9-B46A-EDADE25D1BC8}" dt="2024-04-03T00:13:10.004" v="21" actId="1035"/>
+      <pc:docMkLst>
+        <pc:docMk/>
+      </pc:docMkLst>
+      <pc:sldChg chg="addSp delSp modSp mod">
+        <pc:chgData name="Pak Tsang" userId="e597de51-a393-472f-96bf-05139d3f58b1" providerId="ADAL" clId="{2E378DE0-294A-4DB9-B46A-EDADE25D1BC8}" dt="2024-04-03T00:13:10.004" v="21" actId="1035"/>
+        <pc:sldMkLst>
+          <pc:docMk/>
+          <pc:sldMk cId="1881876514" sldId="256"/>
+        </pc:sldMkLst>
+        <pc:grpChg chg="del">
+          <ac:chgData name="Pak Tsang" userId="e597de51-a393-472f-96bf-05139d3f58b1" providerId="ADAL" clId="{2E378DE0-294A-4DB9-B46A-EDADE25D1BC8}" dt="2024-04-03T00:10:31.657" v="0" actId="478"/>
+          <ac:grpSpMkLst>
+            <pc:docMk/>
+            <pc:sldMk cId="1881876514" sldId="256"/>
+            <ac:grpSpMk id="6" creationId="{0076FD49-368A-4C90-BDF0-20EAD5D80D16}"/>
+          </ac:grpSpMkLst>
+        </pc:grpChg>
+        <pc:picChg chg="add mod">
+          <ac:chgData name="Pak Tsang" userId="e597de51-a393-472f-96bf-05139d3f58b1" providerId="ADAL" clId="{2E378DE0-294A-4DB9-B46A-EDADE25D1BC8}" dt="2024-04-03T00:11:02.876" v="6" actId="14100"/>
+          <ac:picMkLst>
+            <pc:docMk/>
+            <pc:sldMk cId="1881876514" sldId="256"/>
+            <ac:picMk id="3" creationId="{CAD3D221-AC2D-9DDE-80C5-C29D74B255EB}"/>
+          </ac:picMkLst>
+        </pc:picChg>
+        <pc:picChg chg="del topLvl">
+          <ac:chgData name="Pak Tsang" userId="e597de51-a393-472f-96bf-05139d3f58b1" providerId="ADAL" clId="{2E378DE0-294A-4DB9-B46A-EDADE25D1BC8}" dt="2024-04-03T00:11:53.846" v="7" actId="478"/>
+          <ac:picMkLst>
+            <pc:docMk/>
+            <pc:sldMk cId="1881876514" sldId="256"/>
+            <ac:picMk id="5" creationId="{4805DF76-8AFE-FE37-16F8-2669E8E19140}"/>
+          </ac:picMkLst>
+        </pc:picChg>
+        <pc:picChg chg="add mod">
+          <ac:chgData name="Pak Tsang" userId="e597de51-a393-472f-96bf-05139d3f58b1" providerId="ADAL" clId="{2E378DE0-294A-4DB9-B46A-EDADE25D1BC8}" dt="2024-04-03T00:13:10.004" v="21" actId="1035"/>
+          <ac:picMkLst>
+            <pc:docMk/>
+            <pc:sldMk cId="1881876514" sldId="256"/>
+            <ac:picMk id="7" creationId="{2048D6BC-AEB4-3DF3-7304-4412E5946CA6}"/>
+          </ac:picMkLst>
+        </pc:picChg>
+        <pc:picChg chg="del topLvl">
+          <ac:chgData name="Pak Tsang" userId="e597de51-a393-472f-96bf-05139d3f58b1" providerId="ADAL" clId="{2E378DE0-294A-4DB9-B46A-EDADE25D1BC8}" dt="2024-04-03T00:10:31.657" v="0" actId="478"/>
+          <ac:picMkLst>
+            <pc:docMk/>
+            <pc:sldMk cId="1881876514" sldId="256"/>
+            <ac:picMk id="26" creationId="{D7395D10-5C2A-F899-811A-F426D376C8B0}"/>
+          </ac:picMkLst>
+        </pc:picChg>
+      </pc:sldChg>
+    </pc:docChg>
+  </pc:docChgLst>
   <pc:docChgLst>
     <pc:chgData name="Pak Nok Tsang" userId="620709e395157a8a" providerId="LiveId" clId="{51E3AB81-A9B1-430B-9336-349758D1CEE3}"/>
     <pc:docChg chg="undo custSel addSld modSld">
@@ -3552,102 +3609,81 @@
           <a:chExt cx="0" cy="0"/>
         </a:xfrm>
       </p:grpSpPr>
-      <p:grpSp>
-        <p:nvGrpSpPr>
-          <p:cNvPr id="6" name="Group 5">
-            <a:extLst>
-              <a:ext uri="{FF2B5EF4-FFF2-40B4-BE49-F238E27FC236}">
-                <a16:creationId xmlns:a16="http://schemas.microsoft.com/office/drawing/2014/main" id="{0076FD49-368A-4C90-BDF0-20EAD5D80D16}"/>
-              </a:ext>
-            </a:extLst>
-          </p:cNvPr>
-          <p:cNvGrpSpPr/>
+      <p:pic>
+        <p:nvPicPr>
+          <p:cNvPr id="3" name="Graphic 2" descr="Heart organ with solid fill">
+            <a:extLst>
+              <a:ext uri="{FF2B5EF4-FFF2-40B4-BE49-F238E27FC236}">
+                <a16:creationId xmlns:a16="http://schemas.microsoft.com/office/drawing/2014/main" id="{CAD3D221-AC2D-9DDE-80C5-C29D74B255EB}"/>
+              </a:ext>
+            </a:extLst>
+          </p:cNvPr>
+          <p:cNvPicPr>
+            <a:picLocks noChangeAspect="1"/>
+          </p:cNvPicPr>
           <p:nvPr/>
-        </p:nvGrpSpPr>
-        <p:grpSpPr>
+        </p:nvPicPr>
+        <p:blipFill>
+          <a:blip r:embed="rId2">
+            <a:extLst>
+              <a:ext uri="{28A0092B-C50C-407E-A947-70E740481C1C}">
+                <a14:useLocalDpi xmlns:a14="http://schemas.microsoft.com/office/drawing/2010/main" val="0"/>
+              </a:ext>
+              <a:ext uri="{96DAC541-7B7A-43D3-8B79-37D633B846F1}">
+                <asvg:svgBlip xmlns:asvg="http://schemas.microsoft.com/office/drawing/2016/SVG/main" r:embed="rId3"/>
+              </a:ext>
+            </a:extLst>
+          </a:blip>
+          <a:stretch>
+            <a:fillRect/>
+          </a:stretch>
+        </p:blipFill>
+        <p:spPr>
           <a:xfrm>
-            <a:off x="6411928" y="2402423"/>
-            <a:ext cx="1828889" cy="1774723"/>
-            <a:chOff x="6411928" y="2402423"/>
-            <a:chExt cx="1828889" cy="1774723"/>
+            <a:off x="5045112" y="2424198"/>
+            <a:ext cx="1748978" cy="1748978"/>
           </a:xfrm>
-        </p:grpSpPr>
-        <p:pic>
-          <p:nvPicPr>
-            <p:cNvPr id="26" name="Graphic 25" descr="Heart with solid fill">
-              <a:extLst>
-                <a:ext uri="{FF2B5EF4-FFF2-40B4-BE49-F238E27FC236}">
-                  <a16:creationId xmlns:a16="http://schemas.microsoft.com/office/drawing/2014/main" id="{D7395D10-5C2A-F899-811A-F426D376C8B0}"/>
-                </a:ext>
-              </a:extLst>
-            </p:cNvPr>
-            <p:cNvPicPr>
-              <a:picLocks noChangeAspect="1"/>
-            </p:cNvPicPr>
-            <p:nvPr/>
-          </p:nvPicPr>
-          <p:blipFill>
-            <a:blip r:embed="rId2">
-              <a:extLst>
-                <a:ext uri="{28A0092B-C50C-407E-A947-70E740481C1C}">
-                  <a14:useLocalDpi xmlns:a14="http://schemas.microsoft.com/office/drawing/2010/main" val="0"/>
-                </a:ext>
-                <a:ext uri="{96DAC541-7B7A-43D3-8B79-37D633B846F1}">
-                  <asvg:svgBlip xmlns:asvg="http://schemas.microsoft.com/office/drawing/2016/SVG/main" r:embed="rId3"/>
-                </a:ext>
-              </a:extLst>
-            </a:blip>
-            <a:stretch>
-              <a:fillRect/>
-            </a:stretch>
-          </p:blipFill>
-          <p:spPr>
-            <a:xfrm>
-              <a:off x="6411928" y="2402423"/>
-              <a:ext cx="1774723" cy="1774723"/>
-            </a:xfrm>
-            <a:prstGeom prst="rect">
-              <a:avLst/>
-            </a:prstGeom>
-          </p:spPr>
-        </p:pic>
-        <p:pic>
-          <p:nvPicPr>
-            <p:cNvPr id="5" name="Picture 4" descr="A blue lines on a black background&#10;&#10;Description automatically generated">
-              <a:extLst>
-                <a:ext uri="{FF2B5EF4-FFF2-40B4-BE49-F238E27FC236}">
-                  <a16:creationId xmlns:a16="http://schemas.microsoft.com/office/drawing/2014/main" id="{4805DF76-8AFE-FE37-16F8-2669E8E19140}"/>
-                </a:ext>
-              </a:extLst>
-            </p:cNvPr>
-            <p:cNvPicPr>
-              <a:picLocks noChangeAspect="1"/>
-            </p:cNvPicPr>
-            <p:nvPr/>
-          </p:nvPicPr>
-          <p:blipFill>
-            <a:blip r:embed="rId4">
-              <a:extLst>
-                <a:ext uri="{28A0092B-C50C-407E-A947-70E740481C1C}">
-                  <a14:useLocalDpi xmlns:a14="http://schemas.microsoft.com/office/drawing/2010/main" val="0"/>
-                </a:ext>
-              </a:extLst>
-            </a:blip>
-            <a:stretch>
-              <a:fillRect/>
-            </a:stretch>
-          </p:blipFill>
-          <p:spPr>
-            <a:xfrm>
-              <a:off x="6421760" y="2806568"/>
-              <a:ext cx="1819057" cy="1067888"/>
-            </a:xfrm>
-            <a:prstGeom prst="rect">
-              <a:avLst/>
-            </a:prstGeom>
-          </p:spPr>
-        </p:pic>
-      </p:grpSp>
+          <a:prstGeom prst="rect">
+            <a:avLst/>
+          </a:prstGeom>
+        </p:spPr>
+      </p:pic>
+      <p:pic>
+        <p:nvPicPr>
+          <p:cNvPr id="7" name="Picture 6" descr="A black background with a black square&#10;&#10;Description automatically generated with medium confidence">
+            <a:extLst>
+              <a:ext uri="{FF2B5EF4-FFF2-40B4-BE49-F238E27FC236}">
+                <a16:creationId xmlns:a16="http://schemas.microsoft.com/office/drawing/2014/main" id="{2048D6BC-AEB4-3DF3-7304-4412E5946CA6}"/>
+              </a:ext>
+            </a:extLst>
+          </p:cNvPr>
+          <p:cNvPicPr>
+            <a:picLocks noChangeAspect="1"/>
+          </p:cNvPicPr>
+          <p:nvPr/>
+        </p:nvPicPr>
+        <p:blipFill>
+          <a:blip r:embed="rId4">
+            <a:extLst>
+              <a:ext uri="{28A0092B-C50C-407E-A947-70E740481C1C}">
+                <a14:useLocalDpi xmlns:a14="http://schemas.microsoft.com/office/drawing/2010/main" val="0"/>
+              </a:ext>
+            </a:extLst>
+          </a:blip>
+          <a:stretch>
+            <a:fillRect/>
+          </a:stretch>
+        </p:blipFill>
+        <p:spPr>
+          <a:xfrm>
+            <a:off x="5192014" y="3107100"/>
+            <a:ext cx="1748979" cy="1026748"/>
+          </a:xfrm>
+          <a:prstGeom prst="rect">
+            <a:avLst/>
+          </a:prstGeom>
+        </p:spPr>
+      </p:pic>
     </p:spTree>
     <p:extLst>
       <p:ext uri="{BB962C8B-B14F-4D97-AF65-F5344CB8AC3E}">

</xml_diff>

<commit_message>
Deploying to gh-pages from @ tpaknok/CPR@bb4064da32d2b749eb632544ba0fd2dfc7fc32a5 🚀
</commit_message>
<xml_diff>
--- a/reference/figures/Logo ppt.pptx
+++ b/reference/figures/Logo ppt.pptx
@@ -115,7 +115,7 @@
 <file path=ppt/revisionInfo.xml><?xml version="1.0" encoding="utf-8"?>
 <p1510:revInfo xmlns:a="http://schemas.openxmlformats.org/drawingml/2006/main" xmlns:r="http://schemas.openxmlformats.org/officeDocument/2006/relationships" xmlns:p1510="http://schemas.microsoft.com/office/powerpoint/2015/10/main">
   <p1510:revLst>
-    <p1510:client id="{2E378DE0-294A-4DB9-B46A-EDADE25D1BC8}" v="2" dt="2024-04-03T00:12:57.822"/>
+    <p1510:client id="{2E378DE0-294A-4DB9-B46A-EDADE25D1BC8}" v="5" dt="2024-04-03T00:18:51.125"/>
     <p1510:client id="{51E3AB81-A9B1-430B-9336-349758D1CEE3}" v="27" dt="2024-04-02T23:56:54.276"/>
   </p1510:revLst>
 </p1510:revInfo>
@@ -126,12 +126,12 @@
   <pc:docChgLst>
     <pc:chgData name="Pak Tsang" userId="e597de51-a393-472f-96bf-05139d3f58b1" providerId="ADAL" clId="{2E378DE0-294A-4DB9-B46A-EDADE25D1BC8}"/>
     <pc:docChg chg="custSel modSld">
-      <pc:chgData name="Pak Tsang" userId="e597de51-a393-472f-96bf-05139d3f58b1" providerId="ADAL" clId="{2E378DE0-294A-4DB9-B46A-EDADE25D1BC8}" dt="2024-04-03T00:13:10.004" v="21" actId="1035"/>
+      <pc:chgData name="Pak Tsang" userId="e597de51-a393-472f-96bf-05139d3f58b1" providerId="ADAL" clId="{2E378DE0-294A-4DB9-B46A-EDADE25D1BC8}" dt="2024-04-03T00:19:11.516" v="42" actId="14100"/>
       <pc:docMkLst>
         <pc:docMk/>
       </pc:docMkLst>
       <pc:sldChg chg="addSp delSp modSp mod">
-        <pc:chgData name="Pak Tsang" userId="e597de51-a393-472f-96bf-05139d3f58b1" providerId="ADAL" clId="{2E378DE0-294A-4DB9-B46A-EDADE25D1BC8}" dt="2024-04-03T00:13:10.004" v="21" actId="1035"/>
+        <pc:chgData name="Pak Tsang" userId="e597de51-a393-472f-96bf-05139d3f58b1" providerId="ADAL" clId="{2E378DE0-294A-4DB9-B46A-EDADE25D1BC8}" dt="2024-04-03T00:19:11.516" v="42" actId="14100"/>
         <pc:sldMkLst>
           <pc:docMk/>
           <pc:sldMk cId="1881876514" sldId="256"/>
@@ -144,12 +144,28 @@
             <ac:grpSpMk id="6" creationId="{0076FD49-368A-4C90-BDF0-20EAD5D80D16}"/>
           </ac:grpSpMkLst>
         </pc:grpChg>
-        <pc:picChg chg="add mod">
-          <ac:chgData name="Pak Tsang" userId="e597de51-a393-472f-96bf-05139d3f58b1" providerId="ADAL" clId="{2E378DE0-294A-4DB9-B46A-EDADE25D1BC8}" dt="2024-04-03T00:11:02.876" v="6" actId="14100"/>
+        <pc:grpChg chg="add mod">
+          <ac:chgData name="Pak Tsang" userId="e597de51-a393-472f-96bf-05139d3f58b1" providerId="ADAL" clId="{2E378DE0-294A-4DB9-B46A-EDADE25D1BC8}" dt="2024-04-03T00:19:11.516" v="42" actId="14100"/>
+          <ac:grpSpMkLst>
+            <pc:docMk/>
+            <pc:sldMk cId="1881876514" sldId="256"/>
+            <ac:grpSpMk id="8" creationId="{3BF4BC61-755C-DCF1-D4BA-20A9EFF4B038}"/>
+          </ac:grpSpMkLst>
+        </pc:grpChg>
+        <pc:picChg chg="add del mod">
+          <ac:chgData name="Pak Tsang" userId="e597de51-a393-472f-96bf-05139d3f58b1" providerId="ADAL" clId="{2E378DE0-294A-4DB9-B46A-EDADE25D1BC8}" dt="2024-04-03T00:17:40.709" v="23" actId="478"/>
           <ac:picMkLst>
             <pc:docMk/>
             <pc:sldMk cId="1881876514" sldId="256"/>
             <ac:picMk id="3" creationId="{CAD3D221-AC2D-9DDE-80C5-C29D74B255EB}"/>
+          </ac:picMkLst>
+        </pc:picChg>
+        <pc:picChg chg="add mod">
+          <ac:chgData name="Pak Tsang" userId="e597de51-a393-472f-96bf-05139d3f58b1" providerId="ADAL" clId="{2E378DE0-294A-4DB9-B46A-EDADE25D1BC8}" dt="2024-04-03T00:18:51.125" v="40" actId="164"/>
+          <ac:picMkLst>
+            <pc:docMk/>
+            <pc:sldMk cId="1881876514" sldId="256"/>
+            <ac:picMk id="4" creationId="{B7AB4FF7-9D53-D287-4A3E-35ED4DE74747}"/>
           </ac:picMkLst>
         </pc:picChg>
         <pc:picChg chg="del topLvl">
@@ -161,7 +177,15 @@
           </ac:picMkLst>
         </pc:picChg>
         <pc:picChg chg="add mod">
-          <ac:chgData name="Pak Tsang" userId="e597de51-a393-472f-96bf-05139d3f58b1" providerId="ADAL" clId="{2E378DE0-294A-4DB9-B46A-EDADE25D1BC8}" dt="2024-04-03T00:13:10.004" v="21" actId="1035"/>
+          <ac:chgData name="Pak Tsang" userId="e597de51-a393-472f-96bf-05139d3f58b1" providerId="ADAL" clId="{2E378DE0-294A-4DB9-B46A-EDADE25D1BC8}" dt="2024-04-03T00:18:51.125" v="40" actId="164"/>
+          <ac:picMkLst>
+            <pc:docMk/>
+            <pc:sldMk cId="1881876514" sldId="256"/>
+            <ac:picMk id="6" creationId="{58A24D59-4A89-6216-E674-753DD8E75342}"/>
+          </ac:picMkLst>
+        </pc:picChg>
+        <pc:picChg chg="add del mod">
+          <ac:chgData name="Pak Tsang" userId="e597de51-a393-472f-96bf-05139d3f58b1" providerId="ADAL" clId="{2E378DE0-294A-4DB9-B46A-EDADE25D1BC8}" dt="2024-04-03T00:17:40.237" v="22" actId="478"/>
           <ac:picMkLst>
             <pc:docMk/>
             <pc:sldMk cId="1881876514" sldId="256"/>
@@ -3609,81 +3633,102 @@
           <a:chExt cx="0" cy="0"/>
         </a:xfrm>
       </p:grpSpPr>
-      <p:pic>
-        <p:nvPicPr>
-          <p:cNvPr id="3" name="Graphic 2" descr="Heart organ with solid fill">
-            <a:extLst>
-              <a:ext uri="{FF2B5EF4-FFF2-40B4-BE49-F238E27FC236}">
-                <a16:creationId xmlns:a16="http://schemas.microsoft.com/office/drawing/2014/main" id="{CAD3D221-AC2D-9DDE-80C5-C29D74B255EB}"/>
-              </a:ext>
-            </a:extLst>
-          </p:cNvPr>
-          <p:cNvPicPr>
-            <a:picLocks noChangeAspect="1"/>
-          </p:cNvPicPr>
+      <p:grpSp>
+        <p:nvGrpSpPr>
+          <p:cNvPr id="8" name="Group 7">
+            <a:extLst>
+              <a:ext uri="{FF2B5EF4-FFF2-40B4-BE49-F238E27FC236}">
+                <a16:creationId xmlns:a16="http://schemas.microsoft.com/office/drawing/2014/main" id="{3BF4BC61-755C-DCF1-D4BA-20A9EFF4B038}"/>
+              </a:ext>
+            </a:extLst>
+          </p:cNvPr>
+          <p:cNvGrpSpPr/>
           <p:nvPr/>
-        </p:nvPicPr>
-        <p:blipFill>
-          <a:blip r:embed="rId2">
-            <a:extLst>
-              <a:ext uri="{28A0092B-C50C-407E-A947-70E740481C1C}">
-                <a14:useLocalDpi xmlns:a14="http://schemas.microsoft.com/office/drawing/2010/main" val="0"/>
-              </a:ext>
-              <a:ext uri="{96DAC541-7B7A-43D3-8B79-37D633B846F1}">
-                <asvg:svgBlip xmlns:asvg="http://schemas.microsoft.com/office/drawing/2016/SVG/main" r:embed="rId3"/>
-              </a:ext>
-            </a:extLst>
-          </a:blip>
-          <a:stretch>
-            <a:fillRect/>
-          </a:stretch>
-        </p:blipFill>
-        <p:spPr>
+        </p:nvGrpSpPr>
+        <p:grpSpPr>
           <a:xfrm>
-            <a:off x="5045112" y="2424198"/>
-            <a:ext cx="1748978" cy="1748978"/>
+            <a:off x="5862484" y="3195484"/>
+            <a:ext cx="690716" cy="690716"/>
+            <a:chOff x="5102942" y="2435942"/>
+            <a:chExt cx="1450258" cy="1450258"/>
           </a:xfrm>
-          <a:prstGeom prst="rect">
-            <a:avLst/>
-          </a:prstGeom>
-        </p:spPr>
-      </p:pic>
-      <p:pic>
-        <p:nvPicPr>
-          <p:cNvPr id="7" name="Picture 6" descr="A black background with a black square&#10;&#10;Description automatically generated with medium confidence">
-            <a:extLst>
-              <a:ext uri="{FF2B5EF4-FFF2-40B4-BE49-F238E27FC236}">
-                <a16:creationId xmlns:a16="http://schemas.microsoft.com/office/drawing/2014/main" id="{2048D6BC-AEB4-3DF3-7304-4412E5946CA6}"/>
-              </a:ext>
-            </a:extLst>
-          </p:cNvPr>
-          <p:cNvPicPr>
-            <a:picLocks noChangeAspect="1"/>
-          </p:cNvPicPr>
-          <p:nvPr/>
-        </p:nvPicPr>
-        <p:blipFill>
-          <a:blip r:embed="rId4">
-            <a:extLst>
-              <a:ext uri="{28A0092B-C50C-407E-A947-70E740481C1C}">
-                <a14:useLocalDpi xmlns:a14="http://schemas.microsoft.com/office/drawing/2010/main" val="0"/>
-              </a:ext>
-            </a:extLst>
-          </a:blip>
-          <a:stretch>
-            <a:fillRect/>
-          </a:stretch>
-        </p:blipFill>
-        <p:spPr>
-          <a:xfrm>
-            <a:off x="5192014" y="3107100"/>
-            <a:ext cx="1748979" cy="1026748"/>
-          </a:xfrm>
-          <a:prstGeom prst="rect">
-            <a:avLst/>
-          </a:prstGeom>
-        </p:spPr>
-      </p:pic>
+        </p:grpSpPr>
+        <p:pic>
+          <p:nvPicPr>
+            <p:cNvPr id="4" name="Graphic 3" descr="Heart with solid fill">
+              <a:extLst>
+                <a:ext uri="{FF2B5EF4-FFF2-40B4-BE49-F238E27FC236}">
+                  <a16:creationId xmlns:a16="http://schemas.microsoft.com/office/drawing/2014/main" id="{B7AB4FF7-9D53-D287-4A3E-35ED4DE74747}"/>
+                </a:ext>
+              </a:extLst>
+            </p:cNvPr>
+            <p:cNvPicPr>
+              <a:picLocks noChangeAspect="1"/>
+            </p:cNvPicPr>
+            <p:nvPr/>
+          </p:nvPicPr>
+          <p:blipFill>
+            <a:blip r:embed="rId2">
+              <a:extLst>
+                <a:ext uri="{28A0092B-C50C-407E-A947-70E740481C1C}">
+                  <a14:useLocalDpi xmlns:a14="http://schemas.microsoft.com/office/drawing/2010/main" val="0"/>
+                </a:ext>
+                <a:ext uri="{96DAC541-7B7A-43D3-8B79-37D633B846F1}">
+                  <asvg:svgBlip xmlns:asvg="http://schemas.microsoft.com/office/drawing/2016/SVG/main" r:embed="rId3"/>
+                </a:ext>
+              </a:extLst>
+            </a:blip>
+            <a:stretch>
+              <a:fillRect/>
+            </a:stretch>
+          </p:blipFill>
+          <p:spPr>
+            <a:xfrm>
+              <a:off x="5102942" y="2435942"/>
+              <a:ext cx="1450258" cy="1450258"/>
+            </a:xfrm>
+            <a:prstGeom prst="rect">
+              <a:avLst/>
+            </a:prstGeom>
+          </p:spPr>
+        </p:pic>
+        <p:pic>
+          <p:nvPicPr>
+            <p:cNvPr id="6" name="Picture 5" descr="A blue lines on a black background&#10;&#10;Description automatically generated">
+              <a:extLst>
+                <a:ext uri="{FF2B5EF4-FFF2-40B4-BE49-F238E27FC236}">
+                  <a16:creationId xmlns:a16="http://schemas.microsoft.com/office/drawing/2014/main" id="{58A24D59-4A89-6216-E674-753DD8E75342}"/>
+                </a:ext>
+              </a:extLst>
+            </p:cNvPr>
+            <p:cNvPicPr>
+              <a:picLocks noChangeAspect="1"/>
+            </p:cNvPicPr>
+            <p:nvPr/>
+          </p:nvPicPr>
+          <p:blipFill>
+            <a:blip r:embed="rId4">
+              <a:extLst>
+                <a:ext uri="{28A0092B-C50C-407E-A947-70E740481C1C}">
+                  <a14:useLocalDpi xmlns:a14="http://schemas.microsoft.com/office/drawing/2010/main" val="0"/>
+                </a:ext>
+              </a:extLst>
+            </a:blip>
+            <a:stretch>
+              <a:fillRect/>
+            </a:stretch>
+          </p:blipFill>
+          <p:spPr>
+            <a:xfrm>
+              <a:off x="5432960" y="2812026"/>
+              <a:ext cx="830188" cy="778727"/>
+            </a:xfrm>
+            <a:prstGeom prst="rect">
+              <a:avLst/>
+            </a:prstGeom>
+          </p:spPr>
+        </p:pic>
+      </p:grpSp>
     </p:spTree>
     <p:extLst>
       <p:ext uri="{BB962C8B-B14F-4D97-AF65-F5344CB8AC3E}">

</xml_diff>

<commit_message>
Deploying to gh-pages from @ tpaknok/CPR@03ffddfe3fdeb02259e4b7bb67437d13b0faee37 🚀
</commit_message>
<xml_diff>
--- a/reference/figures/Logo ppt.pptx
+++ b/reference/figures/Logo ppt.pptx
@@ -115,7 +115,7 @@
 <file path=ppt/revisionInfo.xml><?xml version="1.0" encoding="utf-8"?>
 <p1510:revInfo xmlns:a="http://schemas.openxmlformats.org/drawingml/2006/main" xmlns:r="http://schemas.openxmlformats.org/officeDocument/2006/relationships" xmlns:p1510="http://schemas.microsoft.com/office/powerpoint/2015/10/main">
   <p1510:revLst>
-    <p1510:client id="{2E378DE0-294A-4DB9-B46A-EDADE25D1BC8}" v="5" dt="2024-04-03T00:18:51.125"/>
+    <p1510:client id="{2E378DE0-294A-4DB9-B46A-EDADE25D1BC8}" v="9" dt="2024-04-03T01:48:32.486"/>
     <p1510:client id="{51E3AB81-A9B1-430B-9336-349758D1CEE3}" v="27" dt="2024-04-02T23:56:54.276"/>
   </p1510:revLst>
 </p1510:revInfo>
@@ -125,13 +125,13 @@
 <pc:chgInfo xmlns:a="http://schemas.openxmlformats.org/drawingml/2006/main" xmlns:r="http://schemas.openxmlformats.org/officeDocument/2006/relationships" xmlns:ac="http://schemas.microsoft.com/office/drawing/2013/main/command" xmlns:pc="http://schemas.microsoft.com/office/powerpoint/2013/main/command">
   <pc:docChgLst>
     <pc:chgData name="Pak Tsang" userId="e597de51-a393-472f-96bf-05139d3f58b1" providerId="ADAL" clId="{2E378DE0-294A-4DB9-B46A-EDADE25D1BC8}"/>
-    <pc:docChg chg="custSel modSld">
-      <pc:chgData name="Pak Tsang" userId="e597de51-a393-472f-96bf-05139d3f58b1" providerId="ADAL" clId="{2E378DE0-294A-4DB9-B46A-EDADE25D1BC8}" dt="2024-04-03T00:19:11.516" v="42" actId="14100"/>
+    <pc:docChg chg="undo custSel modSld">
+      <pc:chgData name="Pak Tsang" userId="e597de51-a393-472f-96bf-05139d3f58b1" providerId="ADAL" clId="{2E378DE0-294A-4DB9-B46A-EDADE25D1BC8}" dt="2024-04-03T01:48:32.486" v="64" actId="164"/>
       <pc:docMkLst>
         <pc:docMk/>
       </pc:docMkLst>
       <pc:sldChg chg="addSp delSp modSp mod">
-        <pc:chgData name="Pak Tsang" userId="e597de51-a393-472f-96bf-05139d3f58b1" providerId="ADAL" clId="{2E378DE0-294A-4DB9-B46A-EDADE25D1BC8}" dt="2024-04-03T00:19:11.516" v="42" actId="14100"/>
+        <pc:chgData name="Pak Tsang" userId="e597de51-a393-472f-96bf-05139d3f58b1" providerId="ADAL" clId="{2E378DE0-294A-4DB9-B46A-EDADE25D1BC8}" dt="2024-04-03T01:48:32.486" v="64" actId="164"/>
         <pc:sldMkLst>
           <pc:docMk/>
           <pc:sldMk cId="1881876514" sldId="256"/>
@@ -144,14 +144,30 @@
             <ac:grpSpMk id="6" creationId="{0076FD49-368A-4C90-BDF0-20EAD5D80D16}"/>
           </ac:grpSpMkLst>
         </pc:grpChg>
-        <pc:grpChg chg="add mod">
-          <ac:chgData name="Pak Tsang" userId="e597de51-a393-472f-96bf-05139d3f58b1" providerId="ADAL" clId="{2E378DE0-294A-4DB9-B46A-EDADE25D1BC8}" dt="2024-04-03T00:19:11.516" v="42" actId="14100"/>
+        <pc:grpChg chg="add del mod">
+          <ac:chgData name="Pak Tsang" userId="e597de51-a393-472f-96bf-05139d3f58b1" providerId="ADAL" clId="{2E378DE0-294A-4DB9-B46A-EDADE25D1BC8}" dt="2024-04-03T01:46:46.001" v="45" actId="478"/>
           <ac:grpSpMkLst>
             <pc:docMk/>
             <pc:sldMk cId="1881876514" sldId="256"/>
             <ac:grpSpMk id="8" creationId="{3BF4BC61-755C-DCF1-D4BA-20A9EFF4B038}"/>
           </ac:grpSpMkLst>
         </pc:grpChg>
+        <pc:grpChg chg="add mod">
+          <ac:chgData name="Pak Tsang" userId="e597de51-a393-472f-96bf-05139d3f58b1" providerId="ADAL" clId="{2E378DE0-294A-4DB9-B46A-EDADE25D1BC8}" dt="2024-04-03T01:48:32.486" v="64" actId="164"/>
+          <ac:grpSpMkLst>
+            <pc:docMk/>
+            <pc:sldMk cId="1881876514" sldId="256"/>
+            <ac:grpSpMk id="11" creationId="{3F848AA9-4847-A407-1B08-68D7AA977E4F}"/>
+          </ac:grpSpMkLst>
+        </pc:grpChg>
+        <pc:picChg chg="add del mod">
+          <ac:chgData name="Pak Tsang" userId="e597de51-a393-472f-96bf-05139d3f58b1" providerId="ADAL" clId="{2E378DE0-294A-4DB9-B46A-EDADE25D1BC8}" dt="2024-04-03T01:47:58.376" v="58" actId="478"/>
+          <ac:picMkLst>
+            <pc:docMk/>
+            <pc:sldMk cId="1881876514" sldId="256"/>
+            <ac:picMk id="3" creationId="{2FEE75AC-2C26-1AE2-93FB-AC069185B228}"/>
+          </ac:picMkLst>
+        </pc:picChg>
         <pc:picChg chg="add del mod">
           <ac:chgData name="Pak Tsang" userId="e597de51-a393-472f-96bf-05139d3f58b1" providerId="ADAL" clId="{2E378DE0-294A-4DB9-B46A-EDADE25D1BC8}" dt="2024-04-03T00:17:40.709" v="23" actId="478"/>
           <ac:picMkLst>
@@ -190,6 +206,22 @@
             <pc:docMk/>
             <pc:sldMk cId="1881876514" sldId="256"/>
             <ac:picMk id="7" creationId="{2048D6BC-AEB4-3DF3-7304-4412E5946CA6}"/>
+          </ac:picMkLst>
+        </pc:picChg>
+        <pc:picChg chg="add mod">
+          <ac:chgData name="Pak Tsang" userId="e597de51-a393-472f-96bf-05139d3f58b1" providerId="ADAL" clId="{2E378DE0-294A-4DB9-B46A-EDADE25D1BC8}" dt="2024-04-03T01:48:32.486" v="64" actId="164"/>
+          <ac:picMkLst>
+            <pc:docMk/>
+            <pc:sldMk cId="1881876514" sldId="256"/>
+            <ac:picMk id="7" creationId="{2CE45C0E-D248-B5D5-9CAC-85B7DC2AE54D}"/>
+          </ac:picMkLst>
+        </pc:picChg>
+        <pc:picChg chg="add mod">
+          <ac:chgData name="Pak Tsang" userId="e597de51-a393-472f-96bf-05139d3f58b1" providerId="ADAL" clId="{2E378DE0-294A-4DB9-B46A-EDADE25D1BC8}" dt="2024-04-03T01:48:32.486" v="64" actId="164"/>
+          <ac:picMkLst>
+            <pc:docMk/>
+            <pc:sldMk cId="1881876514" sldId="256"/>
+            <ac:picMk id="10" creationId="{894C6181-C0CE-0EC2-EAF3-698490376869}"/>
           </ac:picMkLst>
         </pc:picChg>
         <pc:picChg chg="del topLvl">
@@ -3635,10 +3667,10 @@
       </p:grpSpPr>
       <p:grpSp>
         <p:nvGrpSpPr>
-          <p:cNvPr id="8" name="Group 7">
-            <a:extLst>
-              <a:ext uri="{FF2B5EF4-FFF2-40B4-BE49-F238E27FC236}">
-                <a16:creationId xmlns:a16="http://schemas.microsoft.com/office/drawing/2014/main" id="{3BF4BC61-755C-DCF1-D4BA-20A9EFF4B038}"/>
+          <p:cNvPr id="11" name="Group 10">
+            <a:extLst>
+              <a:ext uri="{FF2B5EF4-FFF2-40B4-BE49-F238E27FC236}">
+                <a16:creationId xmlns:a16="http://schemas.microsoft.com/office/drawing/2014/main" id="{3F848AA9-4847-A407-1B08-68D7AA977E4F}"/>
               </a:ext>
             </a:extLst>
           </p:cNvPr>
@@ -3647,18 +3679,18 @@
         </p:nvGrpSpPr>
         <p:grpSpPr>
           <a:xfrm>
-            <a:off x="5862484" y="3195484"/>
-            <a:ext cx="690716" cy="690716"/>
-            <a:chOff x="5102942" y="2435942"/>
-            <a:chExt cx="1450258" cy="1450258"/>
+            <a:off x="4216955" y="2087743"/>
+            <a:ext cx="3096638" cy="3096638"/>
+            <a:chOff x="4216955" y="2087743"/>
+            <a:chExt cx="3096638" cy="3096638"/>
           </a:xfrm>
         </p:grpSpPr>
         <p:pic>
           <p:nvPicPr>
-            <p:cNvPr id="4" name="Graphic 3" descr="Heart with solid fill">
+            <p:cNvPr id="7" name="Graphic 6" descr="Heart organ with solid fill">
               <a:extLst>
                 <a:ext uri="{FF2B5EF4-FFF2-40B4-BE49-F238E27FC236}">
-                  <a16:creationId xmlns:a16="http://schemas.microsoft.com/office/drawing/2014/main" id="{B7AB4FF7-9D53-D287-4A3E-35ED4DE74747}"/>
+                  <a16:creationId xmlns:a16="http://schemas.microsoft.com/office/drawing/2014/main" id="{2CE45C0E-D248-B5D5-9CAC-85B7DC2AE54D}"/>
                 </a:ext>
               </a:extLst>
             </p:cNvPr>
@@ -3684,8 +3716,8 @@
           </p:blipFill>
           <p:spPr>
             <a:xfrm>
-              <a:off x="5102942" y="2435942"/>
-              <a:ext cx="1450258" cy="1450258"/>
+              <a:off x="4216955" y="2087743"/>
+              <a:ext cx="3096638" cy="3096638"/>
             </a:xfrm>
             <a:prstGeom prst="rect">
               <a:avLst/>
@@ -3694,10 +3726,10 @@
         </p:pic>
         <p:pic>
           <p:nvPicPr>
-            <p:cNvPr id="6" name="Picture 5" descr="A blue lines on a black background&#10;&#10;Description automatically generated">
+            <p:cNvPr id="10" name="Picture 9" descr="A black background with a black square&#10;&#10;Description automatically generated with medium confidence">
               <a:extLst>
                 <a:ext uri="{FF2B5EF4-FFF2-40B4-BE49-F238E27FC236}">
-                  <a16:creationId xmlns:a16="http://schemas.microsoft.com/office/drawing/2014/main" id="{58A24D59-4A89-6216-E674-753DD8E75342}"/>
+                  <a16:creationId xmlns:a16="http://schemas.microsoft.com/office/drawing/2014/main" id="{894C6181-C0CE-0EC2-EAF3-698490376869}"/>
                 </a:ext>
               </a:extLst>
             </p:cNvPr>
@@ -3720,8 +3752,8 @@
           </p:blipFill>
           <p:spPr>
             <a:xfrm>
-              <a:off x="5432960" y="2812026"/>
-              <a:ext cx="830188" cy="778727"/>
+              <a:off x="4309620" y="3287948"/>
+              <a:ext cx="3003973" cy="1763499"/>
             </a:xfrm>
             <a:prstGeom prst="rect">
               <a:avLst/>

</xml_diff>